<commit_message>
Add related works slide
</commit_message>
<xml_diff>
--- a/presentation/StarTracker.pptx
+++ b/presentation/StarTracker.pptx
@@ -5,24 +5,25 @@
     <p:sldMasterId id="2147483660" r:id="rId1"/>
   </p:sldMasterIdLst>
   <p:notesMasterIdLst>
-    <p:notesMasterId r:id="rId14"/>
+    <p:notesMasterId r:id="rId15"/>
   </p:notesMasterIdLst>
   <p:handoutMasterIdLst>
-    <p:handoutMasterId r:id="rId15"/>
+    <p:handoutMasterId r:id="rId16"/>
   </p:handoutMasterIdLst>
   <p:sldIdLst>
     <p:sldId id="256" r:id="rId2"/>
     <p:sldId id="368" r:id="rId3"/>
     <p:sldId id="405" r:id="rId4"/>
     <p:sldId id="406" r:id="rId5"/>
-    <p:sldId id="407" r:id="rId6"/>
-    <p:sldId id="369" r:id="rId7"/>
-    <p:sldId id="410" r:id="rId8"/>
-    <p:sldId id="411" r:id="rId9"/>
-    <p:sldId id="412" r:id="rId10"/>
-    <p:sldId id="413" r:id="rId11"/>
-    <p:sldId id="414" r:id="rId12"/>
-    <p:sldId id="415" r:id="rId13"/>
+    <p:sldId id="416" r:id="rId6"/>
+    <p:sldId id="407" r:id="rId7"/>
+    <p:sldId id="369" r:id="rId8"/>
+    <p:sldId id="410" r:id="rId9"/>
+    <p:sldId id="411" r:id="rId10"/>
+    <p:sldId id="412" r:id="rId11"/>
+    <p:sldId id="413" r:id="rId12"/>
+    <p:sldId id="414" r:id="rId13"/>
+    <p:sldId id="415" r:id="rId14"/>
   </p:sldIdLst>
   <p:sldSz cx="9144000" cy="6858000" type="screen4x3"/>
   <p:notesSz cx="6858000" cy="9144000"/>
@@ -4536,7 +4537,7 @@
           <a:p>
             <a:r>
               <a:rPr lang="en-US" dirty="0"/>
-              <a:t>The alternate method</a:t>
+              <a:t>The proposed method: Results</a:t>
             </a:r>
           </a:p>
         </p:txBody>
@@ -4560,6 +4561,201 @@
               <a:rPr kumimoji="0" lang="en-US" smtClean="0"/>
               <a:pPr/>
               <a:t>10</a:t>
+            </a:fld>
+            <a:endParaRPr kumimoji="0" lang="en-US" dirty="0"/>
+          </a:p>
+        </p:txBody>
+      </p:sp>
+      <p:pic>
+        <p:nvPicPr>
+          <p:cNvPr id="7" name="Picture 6" descr="Chart, waterfall chart&#10;&#10;Description automatically generated">
+            <a:extLst>
+              <a:ext uri="{FF2B5EF4-FFF2-40B4-BE49-F238E27FC236}">
+                <a16:creationId xmlns:a16="http://schemas.microsoft.com/office/drawing/2014/main" id="{FECACDD5-9FE9-47C5-8875-37E9F737D123}"/>
+              </a:ext>
+            </a:extLst>
+          </p:cNvPr>
+          <p:cNvPicPr>
+            <a:picLocks noChangeAspect="1"/>
+          </p:cNvPicPr>
+          <p:nvPr/>
+        </p:nvPicPr>
+        <p:blipFill rotWithShape="1">
+          <a:blip r:embed="rId2">
+            <a:extLst>
+              <a:ext uri="{28A0092B-C50C-407E-A947-70E740481C1C}">
+                <a14:useLocalDpi xmlns:a14="http://schemas.microsoft.com/office/drawing/2010/main" val="0"/>
+              </a:ext>
+            </a:extLst>
+          </a:blip>
+          <a:srcRect l="14323" t="5541" r="17968" b="709"/>
+          <a:stretch/>
+        </p:blipFill>
+        <p:spPr>
+          <a:xfrm>
+            <a:off x="434340" y="1371600"/>
+            <a:ext cx="3962400" cy="4114800"/>
+          </a:xfrm>
+          <a:prstGeom prst="rect">
+            <a:avLst/>
+          </a:prstGeom>
+        </p:spPr>
+      </p:pic>
+      <p:pic>
+        <p:nvPicPr>
+          <p:cNvPr id="12" name="Picture 11">
+            <a:extLst>
+              <a:ext uri="{FF2B5EF4-FFF2-40B4-BE49-F238E27FC236}">
+                <a16:creationId xmlns:a16="http://schemas.microsoft.com/office/drawing/2014/main" id="{11DA3195-D3DD-43BE-8F6E-A0AD88F51C64}"/>
+              </a:ext>
+            </a:extLst>
+          </p:cNvPr>
+          <p:cNvPicPr>
+            <a:picLocks noChangeAspect="1"/>
+          </p:cNvPicPr>
+          <p:nvPr/>
+        </p:nvPicPr>
+        <p:blipFill rotWithShape="1">
+          <a:blip r:embed="rId3">
+            <a:extLst>
+              <a:ext uri="{28A0092B-C50C-407E-A947-70E740481C1C}">
+                <a14:useLocalDpi xmlns:a14="http://schemas.microsoft.com/office/drawing/2010/main" val="0"/>
+              </a:ext>
+            </a:extLst>
+          </a:blip>
+          <a:srcRect l="13888" t="5740" r="17362"/>
+          <a:stretch/>
+        </p:blipFill>
+        <p:spPr>
+          <a:xfrm>
+            <a:off x="4396740" y="1371600"/>
+            <a:ext cx="4001622" cy="4114800"/>
+          </a:xfrm>
+          <a:prstGeom prst="rect">
+            <a:avLst/>
+          </a:prstGeom>
+        </p:spPr>
+      </p:pic>
+      <p:sp>
+        <p:nvSpPr>
+          <p:cNvPr id="13" name="TextBox 12">
+            <a:extLst>
+              <a:ext uri="{FF2B5EF4-FFF2-40B4-BE49-F238E27FC236}">
+                <a16:creationId xmlns:a16="http://schemas.microsoft.com/office/drawing/2014/main" id="{558B2AF0-D135-41A8-B5F4-3F3EF7A6E562}"/>
+              </a:ext>
+            </a:extLst>
+          </p:cNvPr>
+          <p:cNvSpPr txBox="1"/>
+          <p:nvPr/>
+        </p:nvSpPr>
+        <p:spPr>
+          <a:xfrm>
+            <a:off x="381000" y="5410200"/>
+            <a:ext cx="8229600" cy="646331"/>
+          </a:xfrm>
+          <a:prstGeom prst="rect">
+            <a:avLst/>
+          </a:prstGeom>
+          <a:noFill/>
+        </p:spPr>
+        <p:txBody>
+          <a:bodyPr wrap="square" rtlCol="0">
+            <a:spAutoFit/>
+          </a:bodyPr>
+          <a:lstStyle/>
+          <a:p>
+            <a:pPr marL="285750" indent="-285750">
+              <a:buFont typeface="Arial" panose="020B0604020202020204" pitchFamily="34" charset="0"/>
+              <a:buChar char="•"/>
+            </a:pPr>
+            <a:r>
+              <a:rPr lang="en-CA" dirty="0"/>
+              <a:t>Struggles with distinguishing between South-East/West skies</a:t>
+            </a:r>
+          </a:p>
+          <a:p>
+            <a:pPr marL="285750" indent="-285750">
+              <a:buFont typeface="Arial" panose="020B0604020202020204" pitchFamily="34" charset="0"/>
+              <a:buChar char="•"/>
+            </a:pPr>
+            <a:r>
+              <a:rPr lang="en-CA" dirty="0"/>
+              <a:t>88.1% accuracy on the test set </a:t>
+            </a:r>
+          </a:p>
+        </p:txBody>
+      </p:sp>
+    </p:spTree>
+    <p:extLst>
+      <p:ext uri="{BB962C8B-B14F-4D97-AF65-F5344CB8AC3E}">
+        <p14:creationId xmlns:p14="http://schemas.microsoft.com/office/powerpoint/2010/main" val="1527105618"/>
+      </p:ext>
+    </p:extLst>
+  </p:cSld>
+  <p:clrMapOvr>
+    <a:masterClrMapping/>
+  </p:clrMapOvr>
+</p:sld>
+</file>
+
+<file path=ppt/slides/slide11.xml><?xml version="1.0" encoding="utf-8"?>
+<p:sld xmlns:a="http://schemas.openxmlformats.org/drawingml/2006/main" xmlns:r="http://schemas.openxmlformats.org/officeDocument/2006/relationships" xmlns:p="http://schemas.openxmlformats.org/presentationml/2006/main">
+  <p:cSld>
+    <p:spTree>
+      <p:nvGrpSpPr>
+        <p:cNvPr id="1" name=""/>
+        <p:cNvGrpSpPr/>
+        <p:nvPr/>
+      </p:nvGrpSpPr>
+      <p:grpSpPr>
+        <a:xfrm>
+          <a:off x="0" y="0"/>
+          <a:ext cx="0" cy="0"/>
+          <a:chOff x="0" y="0"/>
+          <a:chExt cx="0" cy="0"/>
+        </a:xfrm>
+      </p:grpSpPr>
+      <p:sp>
+        <p:nvSpPr>
+          <p:cNvPr id="2" name="Title 1"/>
+          <p:cNvSpPr>
+            <a:spLocks noGrp="1"/>
+          </p:cNvSpPr>
+          <p:nvPr>
+            <p:ph type="title"/>
+          </p:nvPr>
+        </p:nvSpPr>
+        <p:spPr/>
+        <p:txBody>
+          <a:bodyPr/>
+          <a:lstStyle/>
+          <a:p>
+            <a:r>
+              <a:rPr lang="en-US" dirty="0"/>
+              <a:t>The alternate method</a:t>
+            </a:r>
+          </a:p>
+        </p:txBody>
+      </p:sp>
+      <p:sp>
+        <p:nvSpPr>
+          <p:cNvPr id="3" name="Slide Number Placeholder 2"/>
+          <p:cNvSpPr>
+            <a:spLocks noGrp="1"/>
+          </p:cNvSpPr>
+          <p:nvPr>
+            <p:ph type="sldNum" sz="quarter" idx="12"/>
+          </p:nvPr>
+        </p:nvSpPr>
+        <p:spPr/>
+        <p:txBody>
+          <a:bodyPr/>
+          <a:lstStyle/>
+          <a:p>
+            <a:fld id="{EA7C8D44-3667-46F6-9772-CC52308E2A7F}" type="slidenum">
+              <a:rPr kumimoji="0" lang="en-US" smtClean="0"/>
+              <a:pPr/>
+              <a:t>11</a:t>
             </a:fld>
             <a:endParaRPr kumimoji="0" lang="en-US" dirty="0"/>
           </a:p>
@@ -4960,7 +5156,7 @@
 </p:sld>
 </file>
 
-<file path=ppt/slides/slide11.xml><?xml version="1.0" encoding="utf-8"?>
+<file path=ppt/slides/slide12.xml><?xml version="1.0" encoding="utf-8"?>
 <p:sld xmlns:a="http://schemas.openxmlformats.org/drawingml/2006/main" xmlns:r="http://schemas.openxmlformats.org/officeDocument/2006/relationships" xmlns:p="http://schemas.openxmlformats.org/presentationml/2006/main">
   <p:cSld>
     <p:spTree>
@@ -5017,7 +5213,7 @@
             <a:fld id="{EA7C8D44-3667-46F6-9772-CC52308E2A7F}" type="slidenum">
               <a:rPr kumimoji="0" lang="en-US" smtClean="0"/>
               <a:pPr/>
-              <a:t>11</a:t>
+              <a:t>12</a:t>
             </a:fld>
             <a:endParaRPr kumimoji="0" lang="en-US" dirty="0"/>
           </a:p>
@@ -5229,7 +5425,7 @@
 </p:sld>
 </file>
 
-<file path=ppt/slides/slide12.xml><?xml version="1.0" encoding="utf-8"?>
+<file path=ppt/slides/slide13.xml><?xml version="1.0" encoding="utf-8"?>
 <p:sld xmlns:a="http://schemas.openxmlformats.org/drawingml/2006/main" xmlns:r="http://schemas.openxmlformats.org/officeDocument/2006/relationships" xmlns:p="http://schemas.openxmlformats.org/presentationml/2006/main">
   <p:cSld>
     <p:spTree>
@@ -5286,7 +5482,7 @@
             <a:fld id="{EA7C8D44-3667-46F6-9772-CC52308E2A7F}" type="slidenum">
               <a:rPr kumimoji="0" lang="en-US" smtClean="0"/>
               <a:pPr/>
-              <a:t>12</a:t>
+              <a:t>13</a:t>
             </a:fld>
             <a:endParaRPr kumimoji="0" lang="en-US" dirty="0"/>
           </a:p>
@@ -6131,12 +6327,14 @@
         </p:nvSpPr>
         <p:spPr/>
         <p:txBody>
-          <a:bodyPr/>
+          <a:bodyPr>
+            <a:normAutofit/>
+          </a:bodyPr>
           <a:lstStyle/>
           <a:p>
             <a:r>
               <a:rPr lang="en-US" dirty="0"/>
-              <a:t>The proposed method</a:t>
+              <a:t>Related work</a:t>
             </a:r>
           </a:p>
         </p:txBody>
@@ -6160,6 +6358,706 @@
               <a:rPr kumimoji="0" lang="en-US" smtClean="0"/>
               <a:pPr/>
               <a:t>5</a:t>
+            </a:fld>
+            <a:endParaRPr kumimoji="0" lang="en-US" dirty="0"/>
+          </a:p>
+        </p:txBody>
+      </p:sp>
+      <p:sp>
+        <p:nvSpPr>
+          <p:cNvPr id="6" name="Rectangle: Rounded Corners 5">
+            <a:extLst>
+              <a:ext uri="{FF2B5EF4-FFF2-40B4-BE49-F238E27FC236}">
+                <a16:creationId xmlns:a16="http://schemas.microsoft.com/office/drawing/2014/main" id="{EF6FC529-4E77-48FD-B886-E3B7D89C444F}"/>
+              </a:ext>
+            </a:extLst>
+          </p:cNvPr>
+          <p:cNvSpPr/>
+          <p:nvPr/>
+        </p:nvSpPr>
+        <p:spPr>
+          <a:xfrm>
+            <a:off x="762000" y="2057400"/>
+            <a:ext cx="1981200" cy="762000"/>
+          </a:xfrm>
+          <a:prstGeom prst="roundRect">
+            <a:avLst/>
+          </a:prstGeom>
+          <a:noFill/>
+          <a:ln w="28575"/>
+        </p:spPr>
+        <p:style>
+          <a:lnRef idx="2">
+            <a:schemeClr val="accent1">
+              <a:shade val="50000"/>
+            </a:schemeClr>
+          </a:lnRef>
+          <a:fillRef idx="1">
+            <a:schemeClr val="accent1"/>
+          </a:fillRef>
+          <a:effectRef idx="0">
+            <a:schemeClr val="accent1"/>
+          </a:effectRef>
+          <a:fontRef idx="minor">
+            <a:schemeClr val="lt1"/>
+          </a:fontRef>
+        </p:style>
+        <p:txBody>
+          <a:bodyPr rtlCol="0" anchor="ctr"/>
+          <a:lstStyle/>
+          <a:p>
+            <a:pPr algn="ctr"/>
+            <a:endParaRPr lang="en-CA"/>
+          </a:p>
+        </p:txBody>
+      </p:sp>
+      <p:sp>
+        <p:nvSpPr>
+          <p:cNvPr id="8" name="TextBox 7">
+            <a:extLst>
+              <a:ext uri="{FF2B5EF4-FFF2-40B4-BE49-F238E27FC236}">
+                <a16:creationId xmlns:a16="http://schemas.microsoft.com/office/drawing/2014/main" id="{8B4EB02E-062C-4F1C-B279-7274C3C2C7F3}"/>
+              </a:ext>
+            </a:extLst>
+          </p:cNvPr>
+          <p:cNvSpPr txBox="1"/>
+          <p:nvPr/>
+        </p:nvSpPr>
+        <p:spPr>
+          <a:xfrm>
+            <a:off x="636711" y="2115234"/>
+            <a:ext cx="2286000" cy="646331"/>
+          </a:xfrm>
+          <a:prstGeom prst="rect">
+            <a:avLst/>
+          </a:prstGeom>
+          <a:noFill/>
+        </p:spPr>
+        <p:txBody>
+          <a:bodyPr wrap="square" rtlCol="0">
+            <a:spAutoFit/>
+          </a:bodyPr>
+          <a:lstStyle/>
+          <a:p>
+            <a:pPr algn="ctr"/>
+            <a:r>
+              <a:rPr lang="en-CA" dirty="0"/>
+              <a:t>Correlation </a:t>
+            </a:r>
+            <a:br>
+              <a:rPr lang="en-CA" dirty="0"/>
+            </a:br>
+            <a:r>
+              <a:rPr lang="en-CA" dirty="0"/>
+              <a:t>algorithm</a:t>
+            </a:r>
+          </a:p>
+        </p:txBody>
+      </p:sp>
+      <p:sp>
+        <p:nvSpPr>
+          <p:cNvPr id="10" name="Rectangle: Rounded Corners 9">
+            <a:extLst>
+              <a:ext uri="{FF2B5EF4-FFF2-40B4-BE49-F238E27FC236}">
+                <a16:creationId xmlns:a16="http://schemas.microsoft.com/office/drawing/2014/main" id="{915D4E0F-76CD-44F0-936B-36958C0826D9}"/>
+              </a:ext>
+            </a:extLst>
+          </p:cNvPr>
+          <p:cNvSpPr/>
+          <p:nvPr/>
+        </p:nvSpPr>
+        <p:spPr>
+          <a:xfrm>
+            <a:off x="3505200" y="2057400"/>
+            <a:ext cx="1981200" cy="762000"/>
+          </a:xfrm>
+          <a:prstGeom prst="roundRect">
+            <a:avLst/>
+          </a:prstGeom>
+          <a:noFill/>
+          <a:ln w="28575"/>
+        </p:spPr>
+        <p:style>
+          <a:lnRef idx="2">
+            <a:schemeClr val="accent1">
+              <a:shade val="50000"/>
+            </a:schemeClr>
+          </a:lnRef>
+          <a:fillRef idx="1">
+            <a:schemeClr val="accent1"/>
+          </a:fillRef>
+          <a:effectRef idx="0">
+            <a:schemeClr val="accent1"/>
+          </a:effectRef>
+          <a:fontRef idx="minor">
+            <a:schemeClr val="lt1"/>
+          </a:fontRef>
+        </p:style>
+        <p:txBody>
+          <a:bodyPr rtlCol="0" anchor="ctr"/>
+          <a:lstStyle/>
+          <a:p>
+            <a:pPr algn="ctr"/>
+            <a:endParaRPr lang="en-CA"/>
+          </a:p>
+        </p:txBody>
+      </p:sp>
+      <p:sp>
+        <p:nvSpPr>
+          <p:cNvPr id="11" name="TextBox 10">
+            <a:extLst>
+              <a:ext uri="{FF2B5EF4-FFF2-40B4-BE49-F238E27FC236}">
+                <a16:creationId xmlns:a16="http://schemas.microsoft.com/office/drawing/2014/main" id="{0F6CFBA6-51FA-4029-94D1-4AE48334E693}"/>
+              </a:ext>
+            </a:extLst>
+          </p:cNvPr>
+          <p:cNvSpPr txBox="1"/>
+          <p:nvPr/>
+        </p:nvSpPr>
+        <p:spPr>
+          <a:xfrm>
+            <a:off x="3352800" y="2104889"/>
+            <a:ext cx="2286000" cy="646331"/>
+          </a:xfrm>
+          <a:prstGeom prst="rect">
+            <a:avLst/>
+          </a:prstGeom>
+          <a:noFill/>
+        </p:spPr>
+        <p:txBody>
+          <a:bodyPr wrap="square" rtlCol="0">
+            <a:spAutoFit/>
+          </a:bodyPr>
+          <a:lstStyle/>
+          <a:p>
+            <a:pPr algn="ctr"/>
+            <a:r>
+              <a:rPr lang="en-CA" dirty="0"/>
+              <a:t>Optimal image</a:t>
+            </a:r>
+            <a:br>
+              <a:rPr lang="en-CA" dirty="0"/>
+            </a:br>
+            <a:r>
+              <a:rPr lang="en-CA" dirty="0"/>
+              <a:t>matching</a:t>
+            </a:r>
+          </a:p>
+        </p:txBody>
+      </p:sp>
+      <p:sp>
+        <p:nvSpPr>
+          <p:cNvPr id="12" name="Rectangle: Rounded Corners 11">
+            <a:extLst>
+              <a:ext uri="{FF2B5EF4-FFF2-40B4-BE49-F238E27FC236}">
+                <a16:creationId xmlns:a16="http://schemas.microsoft.com/office/drawing/2014/main" id="{40901BC0-F042-4B81-A587-74F8C833EAF2}"/>
+              </a:ext>
+            </a:extLst>
+          </p:cNvPr>
+          <p:cNvSpPr/>
+          <p:nvPr/>
+        </p:nvSpPr>
+        <p:spPr>
+          <a:xfrm>
+            <a:off x="6248400" y="2011597"/>
+            <a:ext cx="1981200" cy="762000"/>
+          </a:xfrm>
+          <a:prstGeom prst="roundRect">
+            <a:avLst/>
+          </a:prstGeom>
+          <a:noFill/>
+          <a:ln w="28575"/>
+        </p:spPr>
+        <p:style>
+          <a:lnRef idx="2">
+            <a:schemeClr val="accent1">
+              <a:shade val="50000"/>
+            </a:schemeClr>
+          </a:lnRef>
+          <a:fillRef idx="1">
+            <a:schemeClr val="accent1"/>
+          </a:fillRef>
+          <a:effectRef idx="0">
+            <a:schemeClr val="accent1"/>
+          </a:effectRef>
+          <a:fontRef idx="minor">
+            <a:schemeClr val="lt1"/>
+          </a:fontRef>
+        </p:style>
+        <p:txBody>
+          <a:bodyPr rtlCol="0" anchor="ctr"/>
+          <a:lstStyle/>
+          <a:p>
+            <a:pPr algn="ctr"/>
+            <a:endParaRPr lang="en-CA"/>
+          </a:p>
+        </p:txBody>
+      </p:sp>
+      <p:sp>
+        <p:nvSpPr>
+          <p:cNvPr id="13" name="TextBox 12">
+            <a:extLst>
+              <a:ext uri="{FF2B5EF4-FFF2-40B4-BE49-F238E27FC236}">
+                <a16:creationId xmlns:a16="http://schemas.microsoft.com/office/drawing/2014/main" id="{011D123F-4C08-4CF8-9855-CF7E5FD00835}"/>
+              </a:ext>
+            </a:extLst>
+          </p:cNvPr>
+          <p:cNvSpPr txBox="1"/>
+          <p:nvPr/>
+        </p:nvSpPr>
+        <p:spPr>
+          <a:xfrm>
+            <a:off x="6096000" y="2059086"/>
+            <a:ext cx="2286000" cy="646331"/>
+          </a:xfrm>
+          <a:prstGeom prst="rect">
+            <a:avLst/>
+          </a:prstGeom>
+          <a:noFill/>
+        </p:spPr>
+        <p:txBody>
+          <a:bodyPr wrap="square" rtlCol="0">
+            <a:spAutoFit/>
+          </a:bodyPr>
+          <a:lstStyle/>
+          <a:p>
+            <a:pPr algn="ctr"/>
+            <a:r>
+              <a:rPr lang="en-CA" dirty="0"/>
+              <a:t>Neural</a:t>
+            </a:r>
+            <a:br>
+              <a:rPr lang="en-CA" dirty="0"/>
+            </a:br>
+            <a:r>
+              <a:rPr lang="en-CA" dirty="0"/>
+              <a:t>Network</a:t>
+            </a:r>
+          </a:p>
+        </p:txBody>
+      </p:sp>
+      <p:sp>
+        <p:nvSpPr>
+          <p:cNvPr id="15" name="TextBox 14">
+            <a:extLst>
+              <a:ext uri="{FF2B5EF4-FFF2-40B4-BE49-F238E27FC236}">
+                <a16:creationId xmlns:a16="http://schemas.microsoft.com/office/drawing/2014/main" id="{2CD4DB93-CD0D-486F-A47B-A22AE9292DCB}"/>
+              </a:ext>
+            </a:extLst>
+          </p:cNvPr>
+          <p:cNvSpPr txBox="1"/>
+          <p:nvPr/>
+        </p:nvSpPr>
+        <p:spPr>
+          <a:xfrm>
+            <a:off x="612648" y="1562181"/>
+            <a:ext cx="4572000" cy="415498"/>
+          </a:xfrm>
+          <a:prstGeom prst="rect">
+            <a:avLst/>
+          </a:prstGeom>
+          <a:noFill/>
+        </p:spPr>
+        <p:txBody>
+          <a:bodyPr wrap="square">
+            <a:spAutoFit/>
+          </a:bodyPr>
+          <a:lstStyle/>
+          <a:p>
+            <a:pPr algn="l"/>
+            <a:r>
+              <a:rPr lang="en-US" sz="700" b="0" i="0" u="none" strike="noStrike" baseline="0" dirty="0"/>
+              <a:t>H. Yoon, Y. Lim, and H. Bang. New star-pattern identification</a:t>
+            </a:r>
+          </a:p>
+          <a:p>
+            <a:pPr algn="l"/>
+            <a:r>
+              <a:rPr lang="en-US" sz="700" b="0" i="0" u="none" strike="noStrike" baseline="0" dirty="0"/>
+              <a:t>using a correlation approach for spacecraft attitude determination.</a:t>
+            </a:r>
+          </a:p>
+          <a:p>
+            <a:pPr algn="l"/>
+            <a:r>
+              <a:rPr lang="en-US" sz="700" b="0" i="0" u="none" strike="noStrike" baseline="0" dirty="0"/>
+              <a:t>Journal of Spacecraft and Rockets, 48(1), 2011.</a:t>
+            </a:r>
+            <a:endParaRPr lang="en-CA" sz="700" dirty="0"/>
+          </a:p>
+        </p:txBody>
+      </p:sp>
+      <p:sp>
+        <p:nvSpPr>
+          <p:cNvPr id="17" name="TextBox 16">
+            <a:extLst>
+              <a:ext uri="{FF2B5EF4-FFF2-40B4-BE49-F238E27FC236}">
+                <a16:creationId xmlns:a16="http://schemas.microsoft.com/office/drawing/2014/main" id="{D2458532-D334-4C54-8885-C5477F53C6B4}"/>
+              </a:ext>
+            </a:extLst>
+          </p:cNvPr>
+          <p:cNvSpPr txBox="1"/>
+          <p:nvPr/>
+        </p:nvSpPr>
+        <p:spPr>
+          <a:xfrm>
+            <a:off x="3352800" y="1503485"/>
+            <a:ext cx="4572000" cy="523220"/>
+          </a:xfrm>
+          <a:prstGeom prst="rect">
+            <a:avLst/>
+          </a:prstGeom>
+          <a:noFill/>
+        </p:spPr>
+        <p:txBody>
+          <a:bodyPr wrap="square">
+            <a:spAutoFit/>
+          </a:bodyPr>
+          <a:lstStyle/>
+          <a:p>
+            <a:pPr algn="l"/>
+            <a:r>
+              <a:rPr lang="en-CA" sz="700" b="0" i="0" u="none" strike="noStrike" baseline="0" dirty="0"/>
+              <a:t>T. </a:t>
+            </a:r>
+            <a:r>
+              <a:rPr lang="en-CA" sz="700" b="0" i="0" u="none" strike="noStrike" baseline="0" dirty="0" err="1"/>
+              <a:t>Delabie</a:t>
+            </a:r>
+            <a:r>
+              <a:rPr lang="en-CA" sz="700" b="0" i="0" u="none" strike="noStrike" baseline="0" dirty="0"/>
+              <a:t>, J.D. </a:t>
+            </a:r>
+            <a:r>
+              <a:rPr lang="en-CA" sz="700" b="0" i="0" u="none" strike="noStrike" baseline="0" dirty="0" err="1"/>
+              <a:t>Schutter</a:t>
+            </a:r>
+            <a:r>
+              <a:rPr lang="en-CA" sz="700" b="0" i="0" u="none" strike="noStrike" baseline="0" dirty="0"/>
+              <a:t>, and B. </a:t>
+            </a:r>
+            <a:r>
+              <a:rPr lang="en-CA" sz="700" b="0" i="0" u="none" strike="noStrike" baseline="0" dirty="0" err="1"/>
+              <a:t>Vandenbussche</a:t>
+            </a:r>
+            <a:r>
+              <a:rPr lang="en-CA" sz="700" b="0" i="0" u="none" strike="noStrike" baseline="0" dirty="0"/>
+              <a:t>. Highly</a:t>
+            </a:r>
+          </a:p>
+          <a:p>
+            <a:pPr algn="l"/>
+            <a:r>
+              <a:rPr lang="en-US" sz="700" b="0" i="0" u="none" strike="noStrike" baseline="0" dirty="0"/>
+              <a:t>efficient attitude-estimation algorithm for star trackers using</a:t>
+            </a:r>
+          </a:p>
+          <a:p>
+            <a:pPr algn="l"/>
+            <a:r>
+              <a:rPr lang="en-US" sz="700" b="0" i="0" u="none" strike="noStrike" baseline="0" dirty="0"/>
+              <a:t>optimal image matching. Journal of Guidance, Control, and</a:t>
+            </a:r>
+          </a:p>
+          <a:p>
+            <a:pPr algn="l"/>
+            <a:r>
+              <a:rPr lang="en-CA" sz="700" b="0" i="0" u="none" strike="noStrike" baseline="0" dirty="0"/>
+              <a:t>Dynamics, 36(6), 2013.</a:t>
+            </a:r>
+            <a:endParaRPr lang="en-CA" sz="700" dirty="0"/>
+          </a:p>
+        </p:txBody>
+      </p:sp>
+      <p:sp>
+        <p:nvSpPr>
+          <p:cNvPr id="19" name="TextBox 18">
+            <a:extLst>
+              <a:ext uri="{FF2B5EF4-FFF2-40B4-BE49-F238E27FC236}">
+                <a16:creationId xmlns:a16="http://schemas.microsoft.com/office/drawing/2014/main" id="{1254A60A-B3D4-47C6-83DC-D2BADEACBB48}"/>
+              </a:ext>
+            </a:extLst>
+          </p:cNvPr>
+          <p:cNvSpPr txBox="1"/>
+          <p:nvPr/>
+        </p:nvSpPr>
+        <p:spPr>
+          <a:xfrm>
+            <a:off x="6092952" y="1555185"/>
+            <a:ext cx="4572000" cy="415498"/>
+          </a:xfrm>
+          <a:prstGeom prst="rect">
+            <a:avLst/>
+          </a:prstGeom>
+          <a:noFill/>
+        </p:spPr>
+        <p:txBody>
+          <a:bodyPr wrap="square">
+            <a:spAutoFit/>
+          </a:bodyPr>
+          <a:lstStyle/>
+          <a:p>
+            <a:pPr algn="l"/>
+            <a:r>
+              <a:rPr lang="en-US" sz="700"/>
+              <a:t>K.T. Kim and H. Bang. Reliable star pattern identification</a:t>
+            </a:r>
+          </a:p>
+          <a:p>
+            <a:pPr algn="l"/>
+            <a:r>
+              <a:rPr lang="en-US" sz="700"/>
+              <a:t>technique by using neural networks. The Journal of the Astronautical</a:t>
+            </a:r>
+          </a:p>
+          <a:p>
+            <a:pPr algn="l"/>
+            <a:r>
+              <a:rPr lang="en-US" sz="700"/>
+              <a:t>Sciences, 52:239–249, 2004.</a:t>
+            </a:r>
+            <a:endParaRPr lang="en-CA" sz="700" dirty="0"/>
+          </a:p>
+        </p:txBody>
+      </p:sp>
+      <p:sp>
+        <p:nvSpPr>
+          <p:cNvPr id="20" name="TextBox 19">
+            <a:extLst>
+              <a:ext uri="{FF2B5EF4-FFF2-40B4-BE49-F238E27FC236}">
+                <a16:creationId xmlns:a16="http://schemas.microsoft.com/office/drawing/2014/main" id="{F6BA8C05-B8D3-4275-840B-154A00B8E1C2}"/>
+              </a:ext>
+            </a:extLst>
+          </p:cNvPr>
+          <p:cNvSpPr txBox="1"/>
+          <p:nvPr/>
+        </p:nvSpPr>
+        <p:spPr>
+          <a:xfrm>
+            <a:off x="612648" y="3200400"/>
+            <a:ext cx="2206752" cy="2585323"/>
+          </a:xfrm>
+          <a:prstGeom prst="rect">
+            <a:avLst/>
+          </a:prstGeom>
+          <a:noFill/>
+        </p:spPr>
+        <p:txBody>
+          <a:bodyPr wrap="square" rtlCol="0">
+            <a:spAutoFit/>
+          </a:bodyPr>
+          <a:lstStyle/>
+          <a:p>
+            <a:pPr marL="285750" indent="-285750">
+              <a:buFont typeface="Arial" panose="020B0604020202020204" pitchFamily="34" charset="0"/>
+              <a:buChar char="•"/>
+            </a:pPr>
+            <a:r>
+              <a:rPr lang="en-CA" dirty="0"/>
+              <a:t>Compare image to on-board database and maximize cost function</a:t>
+            </a:r>
+          </a:p>
+          <a:p>
+            <a:pPr marL="285750" indent="-285750">
+              <a:buFont typeface="Arial" panose="020B0604020202020204" pitchFamily="34" charset="0"/>
+              <a:buChar char="•"/>
+            </a:pPr>
+            <a:r>
+              <a:rPr lang="en-CA" dirty="0"/>
+              <a:t>Stars as Gaussian distributions</a:t>
+            </a:r>
+          </a:p>
+          <a:p>
+            <a:pPr marL="285750" indent="-285750">
+              <a:buFont typeface="Arial" panose="020B0604020202020204" pitchFamily="34" charset="0"/>
+              <a:buChar char="•"/>
+            </a:pPr>
+            <a:r>
+              <a:rPr lang="en-CA" dirty="0"/>
+              <a:t>Correlate images in image space using heat map</a:t>
+            </a:r>
+          </a:p>
+        </p:txBody>
+      </p:sp>
+      <p:sp>
+        <p:nvSpPr>
+          <p:cNvPr id="21" name="TextBox 20">
+            <a:extLst>
+              <a:ext uri="{FF2B5EF4-FFF2-40B4-BE49-F238E27FC236}">
+                <a16:creationId xmlns:a16="http://schemas.microsoft.com/office/drawing/2014/main" id="{2B022DB5-1D2F-402D-B49E-051DE9D1C70D}"/>
+              </a:ext>
+            </a:extLst>
+          </p:cNvPr>
+          <p:cNvSpPr txBox="1"/>
+          <p:nvPr/>
+        </p:nvSpPr>
+        <p:spPr>
+          <a:xfrm>
+            <a:off x="3468624" y="3200399"/>
+            <a:ext cx="2206752" cy="2862322"/>
+          </a:xfrm>
+          <a:prstGeom prst="rect">
+            <a:avLst/>
+          </a:prstGeom>
+          <a:noFill/>
+        </p:spPr>
+        <p:txBody>
+          <a:bodyPr wrap="square" rtlCol="0">
+            <a:spAutoFit/>
+          </a:bodyPr>
+          <a:lstStyle/>
+          <a:p>
+            <a:pPr marL="285750" indent="-285750">
+              <a:buFont typeface="Arial" panose="020B0604020202020204" pitchFamily="34" charset="0"/>
+              <a:buChar char="•"/>
+            </a:pPr>
+            <a:r>
+              <a:rPr lang="en-CA" dirty="0"/>
+              <a:t>Match pairs of images optimally on top of each other</a:t>
+            </a:r>
+          </a:p>
+          <a:p>
+            <a:pPr marL="285750" indent="-285750">
+              <a:buFont typeface="Arial" panose="020B0604020202020204" pitchFamily="34" charset="0"/>
+              <a:buChar char="•"/>
+            </a:pPr>
+            <a:r>
+              <a:rPr lang="en-CA" dirty="0"/>
+              <a:t>Eliminates complex coordinate conversions</a:t>
+            </a:r>
+          </a:p>
+          <a:p>
+            <a:pPr marL="285750" indent="-285750">
+              <a:buFont typeface="Arial" panose="020B0604020202020204" pitchFamily="34" charset="0"/>
+              <a:buChar char="•"/>
+            </a:pPr>
+            <a:r>
+              <a:rPr lang="en-CA" dirty="0"/>
+              <a:t>Uses Euclidean squared distance</a:t>
+            </a:r>
+          </a:p>
+        </p:txBody>
+      </p:sp>
+      <p:sp>
+        <p:nvSpPr>
+          <p:cNvPr id="22" name="TextBox 21">
+            <a:extLst>
+              <a:ext uri="{FF2B5EF4-FFF2-40B4-BE49-F238E27FC236}">
+                <a16:creationId xmlns:a16="http://schemas.microsoft.com/office/drawing/2014/main" id="{1914FD22-C1C4-4B7E-B89F-C4097A39AC1D}"/>
+              </a:ext>
+            </a:extLst>
+          </p:cNvPr>
+          <p:cNvSpPr txBox="1"/>
+          <p:nvPr/>
+        </p:nvSpPr>
+        <p:spPr>
+          <a:xfrm>
+            <a:off x="6092952" y="3200398"/>
+            <a:ext cx="2206752" cy="2308324"/>
+          </a:xfrm>
+          <a:prstGeom prst="rect">
+            <a:avLst/>
+          </a:prstGeom>
+          <a:noFill/>
+        </p:spPr>
+        <p:txBody>
+          <a:bodyPr wrap="square" rtlCol="0">
+            <a:spAutoFit/>
+          </a:bodyPr>
+          <a:lstStyle/>
+          <a:p>
+            <a:pPr marL="285750" indent="-285750">
+              <a:buFont typeface="Arial" panose="020B0604020202020204" pitchFamily="34" charset="0"/>
+              <a:buChar char="•"/>
+            </a:pPr>
+            <a:r>
+              <a:rPr lang="en-CA" dirty="0"/>
+              <a:t>Use neural network to maximize star lookup efficiency</a:t>
+            </a:r>
+          </a:p>
+          <a:p>
+            <a:pPr marL="285750" indent="-285750">
+              <a:buFont typeface="Arial" panose="020B0604020202020204" pitchFamily="34" charset="0"/>
+              <a:buChar char="•"/>
+            </a:pPr>
+            <a:r>
+              <a:rPr lang="en-CA" dirty="0"/>
+              <a:t>Group neighbouring stars together in database</a:t>
+            </a:r>
+          </a:p>
+        </p:txBody>
+      </p:sp>
+    </p:spTree>
+    <p:extLst>
+      <p:ext uri="{BB962C8B-B14F-4D97-AF65-F5344CB8AC3E}">
+        <p14:creationId xmlns:p14="http://schemas.microsoft.com/office/powerpoint/2010/main" val="190913189"/>
+      </p:ext>
+    </p:extLst>
+  </p:cSld>
+  <p:clrMapOvr>
+    <a:masterClrMapping/>
+  </p:clrMapOvr>
+</p:sld>
+</file>
+
+<file path=ppt/slides/slide6.xml><?xml version="1.0" encoding="utf-8"?>
+<p:sld xmlns:a="http://schemas.openxmlformats.org/drawingml/2006/main" xmlns:r="http://schemas.openxmlformats.org/officeDocument/2006/relationships" xmlns:p="http://schemas.openxmlformats.org/presentationml/2006/main">
+  <p:cSld>
+    <p:spTree>
+      <p:nvGrpSpPr>
+        <p:cNvPr id="1" name=""/>
+        <p:cNvGrpSpPr/>
+        <p:nvPr/>
+      </p:nvGrpSpPr>
+      <p:grpSpPr>
+        <a:xfrm>
+          <a:off x="0" y="0"/>
+          <a:ext cx="0" cy="0"/>
+          <a:chOff x="0" y="0"/>
+          <a:chExt cx="0" cy="0"/>
+        </a:xfrm>
+      </p:grpSpPr>
+      <p:sp>
+        <p:nvSpPr>
+          <p:cNvPr id="2" name="Title 1"/>
+          <p:cNvSpPr>
+            <a:spLocks noGrp="1"/>
+          </p:cNvSpPr>
+          <p:nvPr>
+            <p:ph type="title"/>
+          </p:nvPr>
+        </p:nvSpPr>
+        <p:spPr/>
+        <p:txBody>
+          <a:bodyPr/>
+          <a:lstStyle/>
+          <a:p>
+            <a:r>
+              <a:rPr lang="en-US" dirty="0"/>
+              <a:t>The proposed method</a:t>
+            </a:r>
+          </a:p>
+        </p:txBody>
+      </p:sp>
+      <p:sp>
+        <p:nvSpPr>
+          <p:cNvPr id="3" name="Slide Number Placeholder 2"/>
+          <p:cNvSpPr>
+            <a:spLocks noGrp="1"/>
+          </p:cNvSpPr>
+          <p:nvPr>
+            <p:ph type="sldNum" sz="quarter" idx="12"/>
+          </p:nvPr>
+        </p:nvSpPr>
+        <p:spPr/>
+        <p:txBody>
+          <a:bodyPr/>
+          <a:lstStyle/>
+          <a:p>
+            <a:fld id="{EA7C8D44-3667-46F6-9772-CC52308E2A7F}" type="slidenum">
+              <a:rPr kumimoji="0" lang="en-US" smtClean="0"/>
+              <a:pPr/>
+              <a:t>6</a:t>
             </a:fld>
             <a:endParaRPr kumimoji="0" lang="en-US" dirty="0"/>
           </a:p>
@@ -6479,7 +7377,7 @@
 </p:sld>
 </file>
 
-<file path=ppt/slides/slide6.xml><?xml version="1.0" encoding="utf-8"?>
+<file path=ppt/slides/slide7.xml><?xml version="1.0" encoding="utf-8"?>
 <p:sld xmlns:a="http://schemas.openxmlformats.org/drawingml/2006/main" xmlns:r="http://schemas.openxmlformats.org/officeDocument/2006/relationships" xmlns:p="http://schemas.openxmlformats.org/presentationml/2006/main">
   <p:cSld>
     <p:spTree>
@@ -6536,7 +7434,7 @@
             <a:fld id="{EA7C8D44-3667-46F6-9772-CC52308E2A7F}" type="slidenum">
               <a:rPr kumimoji="0" lang="en-US" smtClean="0"/>
               <a:pPr/>
-              <a:t>6</a:t>
+              <a:t>7</a:t>
             </a:fld>
             <a:endParaRPr kumimoji="0" lang="en-US" dirty="0"/>
           </a:p>
@@ -6722,7 +7620,7 @@
 </p:sld>
 </file>
 
-<file path=ppt/slides/slide7.xml><?xml version="1.0" encoding="utf-8"?>
+<file path=ppt/slides/slide8.xml><?xml version="1.0" encoding="utf-8"?>
 <p:sld xmlns:a="http://schemas.openxmlformats.org/drawingml/2006/main" xmlns:r="http://schemas.openxmlformats.org/officeDocument/2006/relationships" xmlns:p="http://schemas.openxmlformats.org/presentationml/2006/main">
   <p:cSld>
     <p:spTree>
@@ -6779,7 +7677,7 @@
             <a:fld id="{EA7C8D44-3667-46F6-9772-CC52308E2A7F}" type="slidenum">
               <a:rPr kumimoji="0" lang="en-US" smtClean="0"/>
               <a:pPr/>
-              <a:t>7</a:t>
+              <a:t>8</a:t>
             </a:fld>
             <a:endParaRPr kumimoji="0" lang="en-US" dirty="0"/>
           </a:p>
@@ -7345,7 +8243,7 @@
 </p:sld>
 </file>
 
-<file path=ppt/slides/slide8.xml><?xml version="1.0" encoding="utf-8"?>
+<file path=ppt/slides/slide9.xml><?xml version="1.0" encoding="utf-8"?>
 <p:sld xmlns:a="http://schemas.openxmlformats.org/drawingml/2006/main" xmlns:r="http://schemas.openxmlformats.org/officeDocument/2006/relationships" xmlns:p="http://schemas.openxmlformats.org/presentationml/2006/main">
   <p:cSld>
     <p:spTree>
@@ -7402,7 +8300,7 @@
             <a:fld id="{EA7C8D44-3667-46F6-9772-CC52308E2A7F}" type="slidenum">
               <a:rPr kumimoji="0" lang="en-US" smtClean="0"/>
               <a:pPr/>
-              <a:t>8</a:t>
+              <a:t>9</a:t>
             </a:fld>
             <a:endParaRPr kumimoji="0" lang="en-US" dirty="0"/>
           </a:p>
@@ -8336,201 +9234,6 @@
     <p:extLst>
       <p:ext uri="{BB962C8B-B14F-4D97-AF65-F5344CB8AC3E}">
         <p14:creationId xmlns:p14="http://schemas.microsoft.com/office/powerpoint/2010/main" val="6019755"/>
-      </p:ext>
-    </p:extLst>
-  </p:cSld>
-  <p:clrMapOvr>
-    <a:masterClrMapping/>
-  </p:clrMapOvr>
-</p:sld>
-</file>
-
-<file path=ppt/slides/slide9.xml><?xml version="1.0" encoding="utf-8"?>
-<p:sld xmlns:a="http://schemas.openxmlformats.org/drawingml/2006/main" xmlns:r="http://schemas.openxmlformats.org/officeDocument/2006/relationships" xmlns:p="http://schemas.openxmlformats.org/presentationml/2006/main">
-  <p:cSld>
-    <p:spTree>
-      <p:nvGrpSpPr>
-        <p:cNvPr id="1" name=""/>
-        <p:cNvGrpSpPr/>
-        <p:nvPr/>
-      </p:nvGrpSpPr>
-      <p:grpSpPr>
-        <a:xfrm>
-          <a:off x="0" y="0"/>
-          <a:ext cx="0" cy="0"/>
-          <a:chOff x="0" y="0"/>
-          <a:chExt cx="0" cy="0"/>
-        </a:xfrm>
-      </p:grpSpPr>
-      <p:sp>
-        <p:nvSpPr>
-          <p:cNvPr id="2" name="Title 1"/>
-          <p:cNvSpPr>
-            <a:spLocks noGrp="1"/>
-          </p:cNvSpPr>
-          <p:nvPr>
-            <p:ph type="title"/>
-          </p:nvPr>
-        </p:nvSpPr>
-        <p:spPr/>
-        <p:txBody>
-          <a:bodyPr/>
-          <a:lstStyle/>
-          <a:p>
-            <a:r>
-              <a:rPr lang="en-US" dirty="0"/>
-              <a:t>The proposed method: Results</a:t>
-            </a:r>
-          </a:p>
-        </p:txBody>
-      </p:sp>
-      <p:sp>
-        <p:nvSpPr>
-          <p:cNvPr id="3" name="Slide Number Placeholder 2"/>
-          <p:cNvSpPr>
-            <a:spLocks noGrp="1"/>
-          </p:cNvSpPr>
-          <p:nvPr>
-            <p:ph type="sldNum" sz="quarter" idx="12"/>
-          </p:nvPr>
-        </p:nvSpPr>
-        <p:spPr/>
-        <p:txBody>
-          <a:bodyPr/>
-          <a:lstStyle/>
-          <a:p>
-            <a:fld id="{EA7C8D44-3667-46F6-9772-CC52308E2A7F}" type="slidenum">
-              <a:rPr kumimoji="0" lang="en-US" smtClean="0"/>
-              <a:pPr/>
-              <a:t>9</a:t>
-            </a:fld>
-            <a:endParaRPr kumimoji="0" lang="en-US" dirty="0"/>
-          </a:p>
-        </p:txBody>
-      </p:sp>
-      <p:pic>
-        <p:nvPicPr>
-          <p:cNvPr id="7" name="Picture 6" descr="Chart, waterfall chart&#10;&#10;Description automatically generated">
-            <a:extLst>
-              <a:ext uri="{FF2B5EF4-FFF2-40B4-BE49-F238E27FC236}">
-                <a16:creationId xmlns:a16="http://schemas.microsoft.com/office/drawing/2014/main" id="{FECACDD5-9FE9-47C5-8875-37E9F737D123}"/>
-              </a:ext>
-            </a:extLst>
-          </p:cNvPr>
-          <p:cNvPicPr>
-            <a:picLocks noChangeAspect="1"/>
-          </p:cNvPicPr>
-          <p:nvPr/>
-        </p:nvPicPr>
-        <p:blipFill rotWithShape="1">
-          <a:blip r:embed="rId2">
-            <a:extLst>
-              <a:ext uri="{28A0092B-C50C-407E-A947-70E740481C1C}">
-                <a14:useLocalDpi xmlns:a14="http://schemas.microsoft.com/office/drawing/2010/main" val="0"/>
-              </a:ext>
-            </a:extLst>
-          </a:blip>
-          <a:srcRect l="14323" t="5541" r="17968" b="709"/>
-          <a:stretch/>
-        </p:blipFill>
-        <p:spPr>
-          <a:xfrm>
-            <a:off x="434340" y="1371600"/>
-            <a:ext cx="3962400" cy="4114800"/>
-          </a:xfrm>
-          <a:prstGeom prst="rect">
-            <a:avLst/>
-          </a:prstGeom>
-        </p:spPr>
-      </p:pic>
-      <p:pic>
-        <p:nvPicPr>
-          <p:cNvPr id="12" name="Picture 11">
-            <a:extLst>
-              <a:ext uri="{FF2B5EF4-FFF2-40B4-BE49-F238E27FC236}">
-                <a16:creationId xmlns:a16="http://schemas.microsoft.com/office/drawing/2014/main" id="{11DA3195-D3DD-43BE-8F6E-A0AD88F51C64}"/>
-              </a:ext>
-            </a:extLst>
-          </p:cNvPr>
-          <p:cNvPicPr>
-            <a:picLocks noChangeAspect="1"/>
-          </p:cNvPicPr>
-          <p:nvPr/>
-        </p:nvPicPr>
-        <p:blipFill rotWithShape="1">
-          <a:blip r:embed="rId3">
-            <a:extLst>
-              <a:ext uri="{28A0092B-C50C-407E-A947-70E740481C1C}">
-                <a14:useLocalDpi xmlns:a14="http://schemas.microsoft.com/office/drawing/2010/main" val="0"/>
-              </a:ext>
-            </a:extLst>
-          </a:blip>
-          <a:srcRect l="13888" t="5740" r="17362"/>
-          <a:stretch/>
-        </p:blipFill>
-        <p:spPr>
-          <a:xfrm>
-            <a:off x="4396740" y="1371600"/>
-            <a:ext cx="4001622" cy="4114800"/>
-          </a:xfrm>
-          <a:prstGeom prst="rect">
-            <a:avLst/>
-          </a:prstGeom>
-        </p:spPr>
-      </p:pic>
-      <p:sp>
-        <p:nvSpPr>
-          <p:cNvPr id="13" name="TextBox 12">
-            <a:extLst>
-              <a:ext uri="{FF2B5EF4-FFF2-40B4-BE49-F238E27FC236}">
-                <a16:creationId xmlns:a16="http://schemas.microsoft.com/office/drawing/2014/main" id="{558B2AF0-D135-41A8-B5F4-3F3EF7A6E562}"/>
-              </a:ext>
-            </a:extLst>
-          </p:cNvPr>
-          <p:cNvSpPr txBox="1"/>
-          <p:nvPr/>
-        </p:nvSpPr>
-        <p:spPr>
-          <a:xfrm>
-            <a:off x="381000" y="5410200"/>
-            <a:ext cx="8229600" cy="646331"/>
-          </a:xfrm>
-          <a:prstGeom prst="rect">
-            <a:avLst/>
-          </a:prstGeom>
-          <a:noFill/>
-        </p:spPr>
-        <p:txBody>
-          <a:bodyPr wrap="square" rtlCol="0">
-            <a:spAutoFit/>
-          </a:bodyPr>
-          <a:lstStyle/>
-          <a:p>
-            <a:pPr marL="285750" indent="-285750">
-              <a:buFont typeface="Arial" panose="020B0604020202020204" pitchFamily="34" charset="0"/>
-              <a:buChar char="•"/>
-            </a:pPr>
-            <a:r>
-              <a:rPr lang="en-CA" dirty="0"/>
-              <a:t>Struggles with distinguishing between South-East/West skies</a:t>
-            </a:r>
-          </a:p>
-          <a:p>
-            <a:pPr marL="285750" indent="-285750">
-              <a:buFont typeface="Arial" panose="020B0604020202020204" pitchFamily="34" charset="0"/>
-              <a:buChar char="•"/>
-            </a:pPr>
-            <a:r>
-              <a:rPr lang="en-CA" dirty="0"/>
-              <a:t>88.1% accuracy on the test set </a:t>
-            </a:r>
-          </a:p>
-        </p:txBody>
-      </p:sp>
-    </p:spTree>
-    <p:extLst>
-      <p:ext uri="{BB962C8B-B14F-4D97-AF65-F5344CB8AC3E}">
-        <p14:creationId xmlns:p14="http://schemas.microsoft.com/office/powerpoint/2010/main" val="1527105618"/>
       </p:ext>
     </p:extLst>
   </p:cSld>

</xml_diff>